<commit_message>
Final edits to candidacy presentation
</commit_message>
<xml_diff>
--- a/Presentations/Candidacy_2019/candidacy_presentation.pptx
+++ b/Presentations/Candidacy_2019/candidacy_presentation.pptx
@@ -5,7 +5,7 @@
     <p:sldMasterId id="2147483648" r:id="rId1"/>
   </p:sldMasterIdLst>
   <p:notesMasterIdLst>
-    <p:notesMasterId r:id="rId49"/>
+    <p:notesMasterId r:id="rId50"/>
   </p:notesMasterIdLst>
   <p:sldIdLst>
     <p:sldId id="257" r:id="rId2"/>
@@ -55,6 +55,7 @@
     <p:sldId id="336" r:id="rId46"/>
     <p:sldId id="327" r:id="rId47"/>
     <p:sldId id="328" r:id="rId48"/>
+    <p:sldId id="338" r:id="rId49"/>
   </p:sldIdLst>
   <p:sldSz cx="12192000" cy="6858000"/>
   <p:notesSz cx="6858000" cy="9144000"/>
@@ -248,7 +249,7 @@
             <a:fld id="{0A84EC41-ECD6-7F4B-B508-87B276563826}" type="datetimeFigureOut">
               <a:rPr lang="en-US" smtClean="0"/>
               <a:pPr/>
-              <a:t>8/4/19</a:t>
+              <a:t>8/5/19</a:t>
             </a:fld>
             <a:endParaRPr lang="en-US" dirty="0"/>
           </a:p>
@@ -756,7 +757,7 @@
           <a:p>
             <a:fld id="{EA8A4960-1D74-124A-A1A9-AC5D4B293218}" type="datetime1">
               <a:rPr lang="en-US" smtClean="0"/>
-              <a:t>8/4/19</a:t>
+              <a:t>8/5/19</a:t>
             </a:fld>
             <a:endParaRPr lang="en-US"/>
           </a:p>
@@ -954,7 +955,7 @@
           <a:p>
             <a:fld id="{98E5CB18-6992-674E-9289-28E496399D4E}" type="datetime1">
               <a:rPr lang="en-US" smtClean="0"/>
-              <a:t>8/4/19</a:t>
+              <a:t>8/5/19</a:t>
             </a:fld>
             <a:endParaRPr lang="en-US"/>
           </a:p>
@@ -1162,7 +1163,7 @@
           <a:p>
             <a:fld id="{CBD5F807-9509-BB43-A5CF-5E9E5AA2F60A}" type="datetime1">
               <a:rPr lang="en-US" smtClean="0"/>
-              <a:t>8/4/19</a:t>
+              <a:t>8/5/19</a:t>
             </a:fld>
             <a:endParaRPr lang="en-US"/>
           </a:p>
@@ -1360,7 +1361,7 @@
           <a:p>
             <a:fld id="{1F85138A-8953-2A47-BFAD-F0E1E7E33C52}" type="datetime1">
               <a:rPr lang="en-US" smtClean="0"/>
-              <a:t>8/4/19</a:t>
+              <a:t>8/5/19</a:t>
             </a:fld>
             <a:endParaRPr lang="en-US"/>
           </a:p>
@@ -1635,7 +1636,7 @@
           <a:p>
             <a:fld id="{BEA31704-8BD3-F347-8855-F9BB6B31C3F9}" type="datetime1">
               <a:rPr lang="en-US" smtClean="0"/>
-              <a:t>8/4/19</a:t>
+              <a:t>8/5/19</a:t>
             </a:fld>
             <a:endParaRPr lang="en-US"/>
           </a:p>
@@ -1900,7 +1901,7 @@
           <a:p>
             <a:fld id="{943464E5-4A1B-C442-9606-954B37762A70}" type="datetime1">
               <a:rPr lang="en-US" smtClean="0"/>
-              <a:t>8/4/19</a:t>
+              <a:t>8/5/19</a:t>
             </a:fld>
             <a:endParaRPr lang="en-US"/>
           </a:p>
@@ -2312,7 +2313,7 @@
           <a:p>
             <a:fld id="{D53B7C02-A73C-8E45-90C7-D7F42F761753}" type="datetime1">
               <a:rPr lang="en-US" smtClean="0"/>
-              <a:t>8/4/19</a:t>
+              <a:t>8/5/19</a:t>
             </a:fld>
             <a:endParaRPr lang="en-US"/>
           </a:p>
@@ -2453,7 +2454,7 @@
           <a:p>
             <a:fld id="{BD68F70A-A33C-BB41-8AA9-DEAFA6243749}" type="datetime1">
               <a:rPr lang="en-US" smtClean="0"/>
-              <a:t>8/4/19</a:t>
+              <a:t>8/5/19</a:t>
             </a:fld>
             <a:endParaRPr lang="en-US"/>
           </a:p>
@@ -2566,7 +2567,7 @@
           <a:p>
             <a:fld id="{31E11F8A-AF0C-9246-9804-58D08DAA33E3}" type="datetime1">
               <a:rPr lang="en-US" smtClean="0"/>
-              <a:t>8/4/19</a:t>
+              <a:t>8/5/19</a:t>
             </a:fld>
             <a:endParaRPr lang="en-US"/>
           </a:p>
@@ -2877,7 +2878,7 @@
           <a:p>
             <a:fld id="{4D4499FB-B2EF-0944-8140-F6CF33BB10E2}" type="datetime1">
               <a:rPr lang="en-US" smtClean="0"/>
-              <a:t>8/4/19</a:t>
+              <a:t>8/5/19</a:t>
             </a:fld>
             <a:endParaRPr lang="en-US"/>
           </a:p>
@@ -3168,7 +3169,7 @@
           <a:p>
             <a:fld id="{B7093E84-8B0C-1145-B233-4359CB60FC11}" type="datetime1">
               <a:rPr lang="en-US" smtClean="0"/>
-              <a:t>8/4/19</a:t>
+              <a:t>8/5/19</a:t>
             </a:fld>
             <a:endParaRPr lang="en-US"/>
           </a:p>
@@ -3412,7 +3413,7 @@
           <a:p>
             <a:fld id="{DCD0AF03-DF39-FD4E-921C-C8CAF70025DE}" type="datetime1">
               <a:rPr lang="en-US" smtClean="0"/>
-              <a:t>8/4/19</a:t>
+              <a:t>8/5/19</a:t>
             </a:fld>
             <a:endParaRPr lang="en-US" dirty="0"/>
           </a:p>
@@ -13223,8 +13224,8 @@
           </a:prstGeom>
         </p:spPr>
       </p:pic>
-      <mc:AlternateContent xmlns:mc="http://schemas.openxmlformats.org/markup-compatibility/2006">
-        <mc:Choice xmlns:a14="http://schemas.microsoft.com/office/drawing/2010/main" Requires="a14">
+      <mc:AlternateContent xmlns:mc="http://schemas.openxmlformats.org/markup-compatibility/2006" xmlns:a14="http://schemas.microsoft.com/office/drawing/2010/main">
+        <mc:Choice Requires="a14">
           <p:sp>
             <p:nvSpPr>
               <p:cNvPr id="7" name="TextBox 6">
@@ -13335,7 +13336,7 @@
             </p:txBody>
           </p:sp>
         </mc:Choice>
-        <mc:Fallback>
+        <mc:Fallback xmlns="">
           <p:sp>
             <p:nvSpPr>
               <p:cNvPr id="7" name="TextBox 6">
@@ -21478,8 +21479,8 @@
           </a:p>
         </p:txBody>
       </p:sp>
-      <mc:AlternateContent xmlns:mc="http://schemas.openxmlformats.org/markup-compatibility/2006">
-        <mc:Choice xmlns:a14="http://schemas.microsoft.com/office/drawing/2010/main" Requires="a14">
+      <mc:AlternateContent xmlns:mc="http://schemas.openxmlformats.org/markup-compatibility/2006" xmlns:a14="http://schemas.microsoft.com/office/drawing/2010/main">
+        <mc:Choice Requires="a14">
           <p:sp>
             <p:nvSpPr>
               <p:cNvPr id="6" name="TextBox 5">
@@ -21510,6 +21511,7 @@
               </a:bodyPr>
               <a:lstStyle/>
               <a:p>
+                <a:pPr/>
                 <a14:m>
                   <m:oMathPara xmlns:m="http://schemas.openxmlformats.org/officeDocument/2006/math">
                     <m:oMathParaPr>
@@ -21570,7 +21572,7 @@
             </p:txBody>
           </p:sp>
         </mc:Choice>
-        <mc:Fallback>
+        <mc:Fallback xmlns="">
           <p:sp>
             <p:nvSpPr>
               <p:cNvPr id="6" name="TextBox 5">
@@ -21615,8 +21617,8 @@
           </p:sp>
         </mc:Fallback>
       </mc:AlternateContent>
-      <mc:AlternateContent xmlns:mc="http://schemas.openxmlformats.org/markup-compatibility/2006">
-        <mc:Choice xmlns:a14="http://schemas.microsoft.com/office/drawing/2010/main" Requires="a14">
+      <mc:AlternateContent xmlns:mc="http://schemas.openxmlformats.org/markup-compatibility/2006" xmlns:a14="http://schemas.microsoft.com/office/drawing/2010/main">
+        <mc:Choice Requires="a14">
           <p:sp>
             <p:nvSpPr>
               <p:cNvPr id="8" name="TextBox 7">
@@ -21685,7 +21687,7 @@
             </p:txBody>
           </p:sp>
         </mc:Choice>
-        <mc:Fallback>
+        <mc:Fallback xmlns="">
           <p:sp>
             <p:nvSpPr>
               <p:cNvPr id="8" name="TextBox 7">
@@ -21730,8 +21732,8 @@
           </p:sp>
         </mc:Fallback>
       </mc:AlternateContent>
-      <mc:AlternateContent xmlns:mc="http://schemas.openxmlformats.org/markup-compatibility/2006">
-        <mc:Choice xmlns:a14="http://schemas.microsoft.com/office/drawing/2010/main" Requires="a14">
+      <mc:AlternateContent xmlns:mc="http://schemas.openxmlformats.org/markup-compatibility/2006" xmlns:a14="http://schemas.microsoft.com/office/drawing/2010/main">
+        <mc:Choice Requires="a14">
           <p:sp>
             <p:nvSpPr>
               <p:cNvPr id="9" name="TextBox 8">
@@ -21762,6 +21764,7 @@
               </a:bodyPr>
               <a:lstStyle/>
               <a:p>
+                <a:pPr/>
                 <a14:m>
                   <m:oMathPara xmlns:m="http://schemas.openxmlformats.org/officeDocument/2006/math">
                     <m:oMathParaPr>
@@ -21822,7 +21825,7 @@
             </p:txBody>
           </p:sp>
         </mc:Choice>
-        <mc:Fallback>
+        <mc:Fallback xmlns="">
           <p:sp>
             <p:nvSpPr>
               <p:cNvPr id="9" name="TextBox 8">
@@ -21867,8 +21870,8 @@
           </p:sp>
         </mc:Fallback>
       </mc:AlternateContent>
-      <mc:AlternateContent xmlns:mc="http://schemas.openxmlformats.org/markup-compatibility/2006">
-        <mc:Choice xmlns:a14="http://schemas.microsoft.com/office/drawing/2010/main" Requires="a14">
+      <mc:AlternateContent xmlns:mc="http://schemas.openxmlformats.org/markup-compatibility/2006" xmlns:a14="http://schemas.microsoft.com/office/drawing/2010/main">
+        <mc:Choice Requires="a14">
           <p:sp>
             <p:nvSpPr>
               <p:cNvPr id="10" name="TextBox 9">
@@ -21899,6 +21902,7 @@
               </a:bodyPr>
               <a:lstStyle/>
               <a:p>
+                <a:pPr/>
                 <a14:m>
                   <m:oMathPara xmlns:m="http://schemas.openxmlformats.org/officeDocument/2006/math">
                     <m:oMathParaPr>
@@ -21959,7 +21963,7 @@
             </p:txBody>
           </p:sp>
         </mc:Choice>
-        <mc:Fallback>
+        <mc:Fallback xmlns="">
           <p:sp>
             <p:nvSpPr>
               <p:cNvPr id="10" name="TextBox 9">
@@ -23028,8 +23032,8 @@
           </a:p>
         </p:txBody>
       </p:sp>
-      <mc:AlternateContent xmlns:mc="http://schemas.openxmlformats.org/markup-compatibility/2006">
-        <mc:Choice xmlns:a14="http://schemas.microsoft.com/office/drawing/2010/main" Requires="a14">
+      <mc:AlternateContent xmlns:mc="http://schemas.openxmlformats.org/markup-compatibility/2006" xmlns:a14="http://schemas.microsoft.com/office/drawing/2010/main">
+        <mc:Choice Requires="a14">
           <p:sp>
             <p:nvSpPr>
               <p:cNvPr id="3" name="Content Placeholder 2">
@@ -23158,7 +23162,7 @@
             </p:txBody>
           </p:sp>
         </mc:Choice>
-        <mc:Fallback>
+        <mc:Fallback xmlns="">
           <p:sp>
             <p:nvSpPr>
               <p:cNvPr id="3" name="Content Placeholder 2">
@@ -24710,41 +24714,12 @@
               </a:lnSpc>
             </a:pPr>
             <a:r>
-              <a:rPr lang="en-US" dirty="0"/>
-              <a:t>Currently microscopic approaches struggle in precision across kinematic ranges or nuclei</a:t>
-            </a:r>
-          </a:p>
-          <a:p>
-            <a:pPr lvl="1">
-              <a:lnSpc>
-                <a:spcPct val="100000"/>
-              </a:lnSpc>
-            </a:pPr>
-            <a:r>
-              <a:rPr lang="en-US" dirty="0"/>
-              <a:t>Can be used to guide phenomenological models</a:t>
-            </a:r>
-          </a:p>
-          <a:p>
-            <a:pPr lvl="1">
-              <a:lnSpc>
-                <a:spcPct val="100000"/>
-              </a:lnSpc>
-            </a:pPr>
-            <a:r>
-              <a:rPr lang="en-US" dirty="0"/>
-              <a:t>Necessary to understand what components are key in computing microscopic models</a:t>
-            </a:r>
-          </a:p>
-          <a:p>
-            <a:pPr>
-              <a:lnSpc>
-                <a:spcPct val="100000"/>
-              </a:lnSpc>
-            </a:pPr>
-            <a:r>
-              <a:rPr lang="en-US" dirty="0"/>
-              <a:t>Need to further understand uncertainty quantification in optical potentials to reliably compare different models</a:t>
+              <a:rPr lang="en-US" dirty="0">
+                <a:solidFill>
+                  <a:srgbClr val="C00000"/>
+                </a:solidFill>
+              </a:rPr>
+              <a:t>Factorization of nuclear structure from the scattering probe is important for extracting information on process independent quantities</a:t>
             </a:r>
           </a:p>
           <a:p>
@@ -24759,8 +24734,20 @@
                   <a:srgbClr val="C00000"/>
                 </a:solidFill>
               </a:rPr>
-              <a:t>Can use renormalization group (RG) methods to investigate scheme dependence in factorization of nuclear structure from the scattering probe</a:t>
+              <a:t>The Similarity Renormalization Group (SRG) is a tool that can be used to analyze scale and scheme dependence of optical potentials</a:t>
             </a:r>
+          </a:p>
+          <a:p>
+            <a:pPr>
+              <a:lnSpc>
+                <a:spcPct val="100000"/>
+              </a:lnSpc>
+            </a:pPr>
+            <a:endParaRPr lang="en-US" sz="2600" dirty="0">
+              <a:solidFill>
+                <a:srgbClr val="C00000"/>
+              </a:solidFill>
+            </a:endParaRPr>
           </a:p>
         </p:txBody>
       </p:sp>
@@ -28406,6 +28393,189 @@
     <p:extLst>
       <p:ext uri="{BB962C8B-B14F-4D97-AF65-F5344CB8AC3E}">
         <p14:creationId xmlns:p14="http://schemas.microsoft.com/office/powerpoint/2010/main" val="3358128560"/>
+      </p:ext>
+    </p:extLst>
+  </p:cSld>
+  <p:clrMapOvr>
+    <a:masterClrMapping/>
+  </p:clrMapOvr>
+</p:sld>
+</file>
+
+<file path=ppt/slides/slide48.xml><?xml version="1.0" encoding="utf-8"?>
+<p:sld xmlns:a="http://schemas.openxmlformats.org/drawingml/2006/main" xmlns:r="http://schemas.openxmlformats.org/officeDocument/2006/relationships" xmlns:p="http://schemas.openxmlformats.org/presentationml/2006/main">
+  <p:cSld>
+    <p:spTree>
+      <p:nvGrpSpPr>
+        <p:cNvPr id="1" name=""/>
+        <p:cNvGrpSpPr/>
+        <p:nvPr/>
+      </p:nvGrpSpPr>
+      <p:grpSpPr>
+        <a:xfrm>
+          <a:off x="0" y="0"/>
+          <a:ext cx="0" cy="0"/>
+          <a:chOff x="0" y="0"/>
+          <a:chExt cx="0" cy="0"/>
+        </a:xfrm>
+      </p:grpSpPr>
+      <p:sp>
+        <p:nvSpPr>
+          <p:cNvPr id="2" name="Title 1">
+            <a:extLst>
+              <a:ext uri="{FF2B5EF4-FFF2-40B4-BE49-F238E27FC236}">
+                <a16:creationId xmlns:a16="http://schemas.microsoft.com/office/drawing/2014/main" id="{9FECE9C7-FBB0-B54D-8E92-C3BC6CA96ED2}"/>
+              </a:ext>
+            </a:extLst>
+          </p:cNvPr>
+          <p:cNvSpPr>
+            <a:spLocks noGrp="1"/>
+          </p:cNvSpPr>
+          <p:nvPr>
+            <p:ph type="title"/>
+          </p:nvPr>
+        </p:nvSpPr>
+        <p:spPr/>
+        <p:txBody>
+          <a:bodyPr/>
+          <a:lstStyle/>
+          <a:p>
+            <a:pPr>
+              <a:lnSpc>
+                <a:spcPct val="100000"/>
+              </a:lnSpc>
+            </a:pPr>
+            <a:r>
+              <a:rPr lang="en-US" dirty="0">
+                <a:solidFill>
+                  <a:srgbClr val="002060"/>
+                </a:solidFill>
+              </a:rPr>
+              <a:t>Outlook</a:t>
+            </a:r>
+            <a:endParaRPr lang="en-US" dirty="0">
+              <a:solidFill>
+                <a:srgbClr val="002060"/>
+              </a:solidFill>
+              <a:latin typeface="Arial" panose="020B0604020202020204" pitchFamily="34" charset="0"/>
+            </a:endParaRPr>
+          </a:p>
+        </p:txBody>
+      </p:sp>
+      <p:sp>
+        <p:nvSpPr>
+          <p:cNvPr id="3" name="Content Placeholder 2">
+            <a:extLst>
+              <a:ext uri="{FF2B5EF4-FFF2-40B4-BE49-F238E27FC236}">
+                <a16:creationId xmlns:a16="http://schemas.microsoft.com/office/drawing/2014/main" id="{1A8FA9B3-1B32-894B-93C2-F90FB63CBDAA}"/>
+              </a:ext>
+            </a:extLst>
+          </p:cNvPr>
+          <p:cNvSpPr>
+            <a:spLocks noGrp="1"/>
+          </p:cNvSpPr>
+          <p:nvPr>
+            <p:ph idx="1"/>
+          </p:nvPr>
+        </p:nvSpPr>
+        <p:spPr/>
+        <p:txBody>
+          <a:bodyPr/>
+          <a:lstStyle/>
+          <a:p>
+            <a:pPr>
+              <a:lnSpc>
+                <a:spcPct val="100000"/>
+              </a:lnSpc>
+            </a:pPr>
+            <a:r>
+              <a:rPr lang="en-US" sz="2600" dirty="0"/>
+              <a:t>Currently microscopic approaches struggle in precision across kinematic ranges or nuclei</a:t>
+            </a:r>
+          </a:p>
+          <a:p>
+            <a:pPr lvl="1">
+              <a:lnSpc>
+                <a:spcPct val="100000"/>
+              </a:lnSpc>
+            </a:pPr>
+            <a:r>
+              <a:rPr lang="en-US" sz="2200" dirty="0"/>
+              <a:t>Can be used to guide phenomenological models</a:t>
+            </a:r>
+          </a:p>
+          <a:p>
+            <a:pPr lvl="1">
+              <a:lnSpc>
+                <a:spcPct val="100000"/>
+              </a:lnSpc>
+            </a:pPr>
+            <a:r>
+              <a:rPr lang="en-US" sz="2200" dirty="0"/>
+              <a:t>Necessary to understand what components are key in computing microscopic models</a:t>
+            </a:r>
+          </a:p>
+          <a:p>
+            <a:pPr>
+              <a:lnSpc>
+                <a:spcPct val="100000"/>
+              </a:lnSpc>
+            </a:pPr>
+            <a:r>
+              <a:rPr lang="en-US" sz="2600" dirty="0"/>
+              <a:t>Need to further understand uncertainty quantification in optical potentials to reliably compare different models</a:t>
+            </a:r>
+          </a:p>
+          <a:p>
+            <a:pPr>
+              <a:lnSpc>
+                <a:spcPct val="100000"/>
+              </a:lnSpc>
+            </a:pPr>
+            <a:r>
+              <a:rPr lang="en-US" sz="2600" dirty="0">
+                <a:solidFill>
+                  <a:srgbClr val="C00000"/>
+                </a:solidFill>
+              </a:rPr>
+              <a:t>Can use renormalization group (RG) methods to investigate scheme dependence in factorization of nuclear structure from the scattering probe</a:t>
+            </a:r>
+          </a:p>
+        </p:txBody>
+      </p:sp>
+      <p:sp>
+        <p:nvSpPr>
+          <p:cNvPr id="5" name="Slide Number Placeholder 4">
+            <a:extLst>
+              <a:ext uri="{FF2B5EF4-FFF2-40B4-BE49-F238E27FC236}">
+                <a16:creationId xmlns:a16="http://schemas.microsoft.com/office/drawing/2014/main" id="{899909DE-6F55-8E42-9188-97B921D683A3}"/>
+              </a:ext>
+            </a:extLst>
+          </p:cNvPr>
+          <p:cNvSpPr>
+            <a:spLocks noGrp="1"/>
+          </p:cNvSpPr>
+          <p:nvPr>
+            <p:ph type="sldNum" sz="quarter" idx="12"/>
+          </p:nvPr>
+        </p:nvSpPr>
+        <p:spPr/>
+        <p:txBody>
+          <a:bodyPr/>
+          <a:lstStyle/>
+          <a:p>
+            <a:fld id="{DD20F09D-B375-B446-8D61-90653E4EE1AB}" type="slidenum">
+              <a:rPr lang="en-US" smtClean="0"/>
+              <a:t>48</a:t>
+            </a:fld>
+            <a:endParaRPr lang="en-US"/>
+          </a:p>
+        </p:txBody>
+      </p:sp>
+    </p:spTree>
+    <p:extLst>
+      <p:ext uri="{BB962C8B-B14F-4D97-AF65-F5344CB8AC3E}">
+        <p14:creationId xmlns:p14="http://schemas.microsoft.com/office/powerpoint/2010/main" val="2181813107"/>
       </p:ext>
     </p:extLst>
   </p:cSld>

</xml_diff>